<commit_message>
added mfem, worked on rotating navier stokes
</commit_message>
<xml_diff>
--- a/images/images_num_methods.pptx
+++ b/images/images_num_methods.pptx
@@ -6,6 +6,7 @@
   </p:sldMasterIdLst>
   <p:sldIdLst>
     <p:sldId id="256" r:id="rId2"/>
+    <p:sldId id="257" r:id="rId3"/>
   </p:sldIdLst>
   <p:sldSz cx="12192000" cy="6858000"/>
   <p:notesSz cx="6858000" cy="9144000"/>
@@ -115,7 +116,7 @@
 <file path=ppt/revisionInfo.xml><?xml version="1.0" encoding="utf-8"?>
 <p1510:revInfo xmlns:a="http://schemas.openxmlformats.org/drawingml/2006/main" xmlns:r="http://schemas.openxmlformats.org/officeDocument/2006/relationships" xmlns:p1510="http://schemas.microsoft.com/office/powerpoint/2015/10/main">
   <p1510:revLst>
-    <p1510:client id="{C807696D-BF52-954F-87D5-3100EE53362C}" v="7" dt="2020-12-02T04:34:03.323"/>
+    <p1510:client id="{1A086B45-9DEB-4B4B-9747-ABD4D452A0A6}" v="23" dt="2021-03-05T00:12:09.583"/>
   </p1510:revLst>
 </p1510:revInfo>
 </file>
@@ -370,6 +371,230 @@
       </pc:sldChg>
     </pc:docChg>
   </pc:docChgLst>
+  <pc:docChgLst>
+    <pc:chgData name="Campos, Alejandro" userId="9e532814-7453-426b-b5e3-f7681b7e143c" providerId="ADAL" clId="{1A086B45-9DEB-4B4B-9747-ABD4D452A0A6}"/>
+    <pc:docChg chg="custSel addSld modSld">
+      <pc:chgData name="Campos, Alejandro" userId="9e532814-7453-426b-b5e3-f7681b7e143c" providerId="ADAL" clId="{1A086B45-9DEB-4B4B-9747-ABD4D452A0A6}" dt="2021-03-05T00:12:17.331" v="207" actId="14100"/>
+      <pc:docMkLst>
+        <pc:docMk/>
+      </pc:docMkLst>
+      <pc:sldChg chg="addSp delSp modSp new mod">
+        <pc:chgData name="Campos, Alejandro" userId="9e532814-7453-426b-b5e3-f7681b7e143c" providerId="ADAL" clId="{1A086B45-9DEB-4B4B-9747-ABD4D452A0A6}" dt="2021-03-05T00:12:17.331" v="207" actId="14100"/>
+        <pc:sldMkLst>
+          <pc:docMk/>
+          <pc:sldMk cId="2986354180" sldId="257"/>
+        </pc:sldMkLst>
+        <pc:spChg chg="del">
+          <ac:chgData name="Campos, Alejandro" userId="9e532814-7453-426b-b5e3-f7681b7e143c" providerId="ADAL" clId="{1A086B45-9DEB-4B4B-9747-ABD4D452A0A6}" dt="2021-03-05T00:04:45.121" v="1" actId="478"/>
+          <ac:spMkLst>
+            <pc:docMk/>
+            <pc:sldMk cId="2986354180" sldId="257"/>
+            <ac:spMk id="2" creationId="{BB0C9DA6-6238-4C43-8A2C-3016B5BC0299}"/>
+          </ac:spMkLst>
+        </pc:spChg>
+        <pc:spChg chg="del">
+          <ac:chgData name="Campos, Alejandro" userId="9e532814-7453-426b-b5e3-f7681b7e143c" providerId="ADAL" clId="{1A086B45-9DEB-4B4B-9747-ABD4D452A0A6}" dt="2021-03-05T00:04:46.664" v="2" actId="478"/>
+          <ac:spMkLst>
+            <pc:docMk/>
+            <pc:sldMk cId="2986354180" sldId="257"/>
+            <ac:spMk id="3" creationId="{9524643E-47DC-4B0D-9DDF-2E42F8BFC13B}"/>
+          </ac:spMkLst>
+        </pc:spChg>
+        <pc:spChg chg="add mod">
+          <ac:chgData name="Campos, Alejandro" userId="9e532814-7453-426b-b5e3-f7681b7e143c" providerId="ADAL" clId="{1A086B45-9DEB-4B4B-9747-ABD4D452A0A6}" dt="2021-03-05T00:05:01.232" v="5" actId="1076"/>
+          <ac:spMkLst>
+            <pc:docMk/>
+            <pc:sldMk cId="2986354180" sldId="257"/>
+            <ac:spMk id="4" creationId="{121308C4-2E3E-4F3D-A394-FADB8C0222E1}"/>
+          </ac:spMkLst>
+        </pc:spChg>
+        <pc:spChg chg="add mod">
+          <ac:chgData name="Campos, Alejandro" userId="9e532814-7453-426b-b5e3-f7681b7e143c" providerId="ADAL" clId="{1A086B45-9DEB-4B4B-9747-ABD4D452A0A6}" dt="2021-03-05T00:05:17.752" v="31" actId="1036"/>
+          <ac:spMkLst>
+            <pc:docMk/>
+            <pc:sldMk cId="2986354180" sldId="257"/>
+            <ac:spMk id="5" creationId="{92C9CBEA-75BF-43B1-A8F6-A80EA453EEAD}"/>
+          </ac:spMkLst>
+        </pc:spChg>
+        <pc:spChg chg="add mod">
+          <ac:chgData name="Campos, Alejandro" userId="9e532814-7453-426b-b5e3-f7681b7e143c" providerId="ADAL" clId="{1A086B45-9DEB-4B4B-9747-ABD4D452A0A6}" dt="2021-03-05T00:05:28.577" v="41" actId="20577"/>
+          <ac:spMkLst>
+            <pc:docMk/>
+            <pc:sldMk cId="2986354180" sldId="257"/>
+            <ac:spMk id="6" creationId="{F41A4D95-6294-424A-A44D-46A22CDE9056}"/>
+          </ac:spMkLst>
+        </pc:spChg>
+        <pc:spChg chg="add mod">
+          <ac:chgData name="Campos, Alejandro" userId="9e532814-7453-426b-b5e3-f7681b7e143c" providerId="ADAL" clId="{1A086B45-9DEB-4B4B-9747-ABD4D452A0A6}" dt="2021-03-05T00:05:46.178" v="59" actId="20577"/>
+          <ac:spMkLst>
+            <pc:docMk/>
+            <pc:sldMk cId="2986354180" sldId="257"/>
+            <ac:spMk id="7" creationId="{1BF7E86D-EB74-4684-885A-078F2952FB3D}"/>
+          </ac:spMkLst>
+        </pc:spChg>
+        <pc:spChg chg="add mod">
+          <ac:chgData name="Campos, Alejandro" userId="9e532814-7453-426b-b5e3-f7681b7e143c" providerId="ADAL" clId="{1A086B45-9DEB-4B4B-9747-ABD4D452A0A6}" dt="2021-03-05T00:05:59.441" v="73" actId="20577"/>
+          <ac:spMkLst>
+            <pc:docMk/>
+            <pc:sldMk cId="2986354180" sldId="257"/>
+            <ac:spMk id="8" creationId="{BCA3D6ED-FC09-45C2-BE4E-00CCCA859C2D}"/>
+          </ac:spMkLst>
+        </pc:spChg>
+        <pc:spChg chg="add mod">
+          <ac:chgData name="Campos, Alejandro" userId="9e532814-7453-426b-b5e3-f7681b7e143c" providerId="ADAL" clId="{1A086B45-9DEB-4B4B-9747-ABD4D452A0A6}" dt="2021-03-05T00:06:06.529" v="78" actId="20577"/>
+          <ac:spMkLst>
+            <pc:docMk/>
+            <pc:sldMk cId="2986354180" sldId="257"/>
+            <ac:spMk id="9" creationId="{DEA41EFD-5CD4-4DC6-B040-A19C944DEE88}"/>
+          </ac:spMkLst>
+        </pc:spChg>
+        <pc:spChg chg="add mod">
+          <ac:chgData name="Campos, Alejandro" userId="9e532814-7453-426b-b5e3-f7681b7e143c" providerId="ADAL" clId="{1A086B45-9DEB-4B4B-9747-ABD4D452A0A6}" dt="2021-03-05T00:06:18.288" v="85" actId="20577"/>
+          <ac:spMkLst>
+            <pc:docMk/>
+            <pc:sldMk cId="2986354180" sldId="257"/>
+            <ac:spMk id="10" creationId="{D52B9E34-8E8F-449A-AE1F-31E3DDC221C3}"/>
+          </ac:spMkLst>
+        </pc:spChg>
+        <pc:spChg chg="add mod">
+          <ac:chgData name="Campos, Alejandro" userId="9e532814-7453-426b-b5e3-f7681b7e143c" providerId="ADAL" clId="{1A086B45-9DEB-4B4B-9747-ABD4D452A0A6}" dt="2021-03-05T00:06:23.049" v="90" actId="20577"/>
+          <ac:spMkLst>
+            <pc:docMk/>
+            <pc:sldMk cId="2986354180" sldId="257"/>
+            <ac:spMk id="11" creationId="{AE1C2BC6-FBC6-4DBA-AD5D-4CF9074077F2}"/>
+          </ac:spMkLst>
+        </pc:spChg>
+        <pc:spChg chg="add mod">
+          <ac:chgData name="Campos, Alejandro" userId="9e532814-7453-426b-b5e3-f7681b7e143c" providerId="ADAL" clId="{1A086B45-9DEB-4B4B-9747-ABD4D452A0A6}" dt="2021-03-05T00:08:40.178" v="157" actId="20577"/>
+          <ac:spMkLst>
+            <pc:docMk/>
+            <pc:sldMk cId="2986354180" sldId="257"/>
+            <ac:spMk id="12" creationId="{817B6B7C-417F-4328-AA10-0B990C1A95EB}"/>
+          </ac:spMkLst>
+        </pc:spChg>
+        <pc:spChg chg="add mod">
+          <ac:chgData name="Campos, Alejandro" userId="9e532814-7453-426b-b5e3-f7681b7e143c" providerId="ADAL" clId="{1A086B45-9DEB-4B4B-9747-ABD4D452A0A6}" dt="2021-03-05T00:07:04.170" v="109" actId="20577"/>
+          <ac:spMkLst>
+            <pc:docMk/>
+            <pc:sldMk cId="2986354180" sldId="257"/>
+            <ac:spMk id="13" creationId="{3BFF5A7E-88FA-42E0-83AB-1BDE2C93B3F0}"/>
+          </ac:spMkLst>
+        </pc:spChg>
+        <pc:spChg chg="add mod">
+          <ac:chgData name="Campos, Alejandro" userId="9e532814-7453-426b-b5e3-f7681b7e143c" providerId="ADAL" clId="{1A086B45-9DEB-4B4B-9747-ABD4D452A0A6}" dt="2021-03-05T00:08:46.482" v="173" actId="20577"/>
+          <ac:spMkLst>
+            <pc:docMk/>
+            <pc:sldMk cId="2986354180" sldId="257"/>
+            <ac:spMk id="14" creationId="{4DF18C08-43B1-4781-AF54-85ECB26D27F8}"/>
+          </ac:spMkLst>
+        </pc:spChg>
+        <pc:spChg chg="add mod">
+          <ac:chgData name="Campos, Alejandro" userId="9e532814-7453-426b-b5e3-f7681b7e143c" providerId="ADAL" clId="{1A086B45-9DEB-4B4B-9747-ABD4D452A0A6}" dt="2021-03-05T00:08:13.673" v="129" actId="20577"/>
+          <ac:spMkLst>
+            <pc:docMk/>
+            <pc:sldMk cId="2986354180" sldId="257"/>
+            <ac:spMk id="15" creationId="{0B539B23-8772-44B8-9DE6-D6815E8B1E1C}"/>
+          </ac:spMkLst>
+        </pc:spChg>
+        <pc:spChg chg="add mod">
+          <ac:chgData name="Campos, Alejandro" userId="9e532814-7453-426b-b5e3-f7681b7e143c" providerId="ADAL" clId="{1A086B45-9DEB-4B4B-9747-ABD4D452A0A6}" dt="2021-03-05T00:08:30.194" v="143" actId="20577"/>
+          <ac:spMkLst>
+            <pc:docMk/>
+            <pc:sldMk cId="2986354180" sldId="257"/>
+            <ac:spMk id="16" creationId="{E311D4A4-6390-4140-A3DD-F4878D36DC07}"/>
+          </ac:spMkLst>
+        </pc:spChg>
+        <pc:cxnChg chg="add mod">
+          <ac:chgData name="Campos, Alejandro" userId="9e532814-7453-426b-b5e3-f7681b7e143c" providerId="ADAL" clId="{1A086B45-9DEB-4B4B-9747-ABD4D452A0A6}" dt="2021-03-05T00:11:09.946" v="176" actId="14100"/>
+          <ac:cxnSpMkLst>
+            <pc:docMk/>
+            <pc:sldMk cId="2986354180" sldId="257"/>
+            <ac:cxnSpMk id="17" creationId="{045286BB-399E-43E6-8FCA-7B6D789E8CFA}"/>
+          </ac:cxnSpMkLst>
+        </pc:cxnChg>
+        <pc:cxnChg chg="add mod">
+          <ac:chgData name="Campos, Alejandro" userId="9e532814-7453-426b-b5e3-f7681b7e143c" providerId="ADAL" clId="{1A086B45-9DEB-4B4B-9747-ABD4D452A0A6}" dt="2021-03-05T00:11:17.594" v="179" actId="14100"/>
+          <ac:cxnSpMkLst>
+            <pc:docMk/>
+            <pc:sldMk cId="2986354180" sldId="257"/>
+            <ac:cxnSpMk id="20" creationId="{023D619B-DE59-4C8F-8A98-22BE930782D9}"/>
+          </ac:cxnSpMkLst>
+        </pc:cxnChg>
+        <pc:cxnChg chg="add mod">
+          <ac:chgData name="Campos, Alejandro" userId="9e532814-7453-426b-b5e3-f7681b7e143c" providerId="ADAL" clId="{1A086B45-9DEB-4B4B-9747-ABD4D452A0A6}" dt="2021-03-05T00:11:22.747" v="182" actId="14100"/>
+          <ac:cxnSpMkLst>
+            <pc:docMk/>
+            <pc:sldMk cId="2986354180" sldId="257"/>
+            <ac:cxnSpMk id="23" creationId="{BAB5042E-A3A8-4684-A2C5-E2AC929EC77E}"/>
+          </ac:cxnSpMkLst>
+        </pc:cxnChg>
+        <pc:cxnChg chg="add mod">
+          <ac:chgData name="Campos, Alejandro" userId="9e532814-7453-426b-b5e3-f7681b7e143c" providerId="ADAL" clId="{1A086B45-9DEB-4B4B-9747-ABD4D452A0A6}" dt="2021-03-05T00:11:28.010" v="185" actId="14100"/>
+          <ac:cxnSpMkLst>
+            <pc:docMk/>
+            <pc:sldMk cId="2986354180" sldId="257"/>
+            <ac:cxnSpMk id="26" creationId="{BFBEA564-41B4-4BCD-A345-4D8057BFA960}"/>
+          </ac:cxnSpMkLst>
+        </pc:cxnChg>
+        <pc:cxnChg chg="add mod">
+          <ac:chgData name="Campos, Alejandro" userId="9e532814-7453-426b-b5e3-f7681b7e143c" providerId="ADAL" clId="{1A086B45-9DEB-4B4B-9747-ABD4D452A0A6}" dt="2021-03-05T00:11:34.898" v="188" actId="14100"/>
+          <ac:cxnSpMkLst>
+            <pc:docMk/>
+            <pc:sldMk cId="2986354180" sldId="257"/>
+            <ac:cxnSpMk id="29" creationId="{CBA61C35-5B66-4388-8A96-F4CA4AE65AA6}"/>
+          </ac:cxnSpMkLst>
+        </pc:cxnChg>
+        <pc:cxnChg chg="add mod">
+          <ac:chgData name="Campos, Alejandro" userId="9e532814-7453-426b-b5e3-f7681b7e143c" providerId="ADAL" clId="{1A086B45-9DEB-4B4B-9747-ABD4D452A0A6}" dt="2021-03-05T00:11:41.899" v="191" actId="14100"/>
+          <ac:cxnSpMkLst>
+            <pc:docMk/>
+            <pc:sldMk cId="2986354180" sldId="257"/>
+            <ac:cxnSpMk id="32" creationId="{D31C8629-916E-42DE-B847-0ECCBFB071F5}"/>
+          </ac:cxnSpMkLst>
+        </pc:cxnChg>
+        <pc:cxnChg chg="add mod">
+          <ac:chgData name="Campos, Alejandro" userId="9e532814-7453-426b-b5e3-f7681b7e143c" providerId="ADAL" clId="{1A086B45-9DEB-4B4B-9747-ABD4D452A0A6}" dt="2021-03-05T00:11:48.923" v="194" actId="14100"/>
+          <ac:cxnSpMkLst>
+            <pc:docMk/>
+            <pc:sldMk cId="2986354180" sldId="257"/>
+            <ac:cxnSpMk id="35" creationId="{3755E7D5-F571-40A5-AAF7-F02E423C19AF}"/>
+          </ac:cxnSpMkLst>
+        </pc:cxnChg>
+        <pc:cxnChg chg="add mod">
+          <ac:chgData name="Campos, Alejandro" userId="9e532814-7453-426b-b5e3-f7681b7e143c" providerId="ADAL" clId="{1A086B45-9DEB-4B4B-9747-ABD4D452A0A6}" dt="2021-03-05T00:11:55.658" v="197" actId="14100"/>
+          <ac:cxnSpMkLst>
+            <pc:docMk/>
+            <pc:sldMk cId="2986354180" sldId="257"/>
+            <ac:cxnSpMk id="38" creationId="{96019C68-655B-464D-8B9B-93D6D67A0A48}"/>
+          </ac:cxnSpMkLst>
+        </pc:cxnChg>
+        <pc:cxnChg chg="add mod">
+          <ac:chgData name="Campos, Alejandro" userId="9e532814-7453-426b-b5e3-f7681b7e143c" providerId="ADAL" clId="{1A086B45-9DEB-4B4B-9747-ABD4D452A0A6}" dt="2021-03-05T00:12:02.483" v="200" actId="14100"/>
+          <ac:cxnSpMkLst>
+            <pc:docMk/>
+            <pc:sldMk cId="2986354180" sldId="257"/>
+            <ac:cxnSpMk id="41" creationId="{0B369185-E6DE-4D0F-90ED-6B04DEFCE478}"/>
+          </ac:cxnSpMkLst>
+        </pc:cxnChg>
+        <pc:cxnChg chg="add mod">
+          <ac:chgData name="Campos, Alejandro" userId="9e532814-7453-426b-b5e3-f7681b7e143c" providerId="ADAL" clId="{1A086B45-9DEB-4B4B-9747-ABD4D452A0A6}" dt="2021-03-05T00:12:08.506" v="203" actId="14100"/>
+          <ac:cxnSpMkLst>
+            <pc:docMk/>
+            <pc:sldMk cId="2986354180" sldId="257"/>
+            <ac:cxnSpMk id="44" creationId="{2D102666-8FFE-4ED0-B752-51B83492D5D1}"/>
+          </ac:cxnSpMkLst>
+        </pc:cxnChg>
+        <pc:cxnChg chg="add mod">
+          <ac:chgData name="Campos, Alejandro" userId="9e532814-7453-426b-b5e3-f7681b7e143c" providerId="ADAL" clId="{1A086B45-9DEB-4B4B-9747-ABD4D452A0A6}" dt="2021-03-05T00:12:17.331" v="207" actId="14100"/>
+          <ac:cxnSpMkLst>
+            <pc:docMk/>
+            <pc:sldMk cId="2986354180" sldId="257"/>
+            <ac:cxnSpMk id="47" creationId="{F4D4A86B-C372-4ACB-95AA-627A7A5E38CD}"/>
+          </ac:cxnSpMkLst>
+        </pc:cxnChg>
+      </pc:sldChg>
+    </pc:docChg>
+  </pc:docChgLst>
 </pc:chgInfo>
 </file>
 
@@ -520,7 +745,7 @@
           <a:p>
             <a:fld id="{27D20013-6861-114D-B618-24C2282886EC}" type="datetimeFigureOut">
               <a:rPr lang="en-US" smtClean="0"/>
-              <a:t>12/1/20</a:t>
+              <a:t>3/4/2021</a:t>
             </a:fld>
             <a:endParaRPr lang="en-US"/>
           </a:p>
@@ -718,7 +943,7 @@
           <a:p>
             <a:fld id="{27D20013-6861-114D-B618-24C2282886EC}" type="datetimeFigureOut">
               <a:rPr lang="en-US" smtClean="0"/>
-              <a:t>12/1/20</a:t>
+              <a:t>3/4/2021</a:t>
             </a:fld>
             <a:endParaRPr lang="en-US"/>
           </a:p>
@@ -926,7 +1151,7 @@
           <a:p>
             <a:fld id="{27D20013-6861-114D-B618-24C2282886EC}" type="datetimeFigureOut">
               <a:rPr lang="en-US" smtClean="0"/>
-              <a:t>12/1/20</a:t>
+              <a:t>3/4/2021</a:t>
             </a:fld>
             <a:endParaRPr lang="en-US"/>
           </a:p>
@@ -1124,7 +1349,7 @@
           <a:p>
             <a:fld id="{27D20013-6861-114D-B618-24C2282886EC}" type="datetimeFigureOut">
               <a:rPr lang="en-US" smtClean="0"/>
-              <a:t>12/1/20</a:t>
+              <a:t>3/4/2021</a:t>
             </a:fld>
             <a:endParaRPr lang="en-US"/>
           </a:p>
@@ -1399,7 +1624,7 @@
           <a:p>
             <a:fld id="{27D20013-6861-114D-B618-24C2282886EC}" type="datetimeFigureOut">
               <a:rPr lang="en-US" smtClean="0"/>
-              <a:t>12/1/20</a:t>
+              <a:t>3/4/2021</a:t>
             </a:fld>
             <a:endParaRPr lang="en-US"/>
           </a:p>
@@ -1664,7 +1889,7 @@
           <a:p>
             <a:fld id="{27D20013-6861-114D-B618-24C2282886EC}" type="datetimeFigureOut">
               <a:rPr lang="en-US" smtClean="0"/>
-              <a:t>12/1/20</a:t>
+              <a:t>3/4/2021</a:t>
             </a:fld>
             <a:endParaRPr lang="en-US"/>
           </a:p>
@@ -2076,7 +2301,7 @@
           <a:p>
             <a:fld id="{27D20013-6861-114D-B618-24C2282886EC}" type="datetimeFigureOut">
               <a:rPr lang="en-US" smtClean="0"/>
-              <a:t>12/1/20</a:t>
+              <a:t>3/4/2021</a:t>
             </a:fld>
             <a:endParaRPr lang="en-US"/>
           </a:p>
@@ -2217,7 +2442,7 @@
           <a:p>
             <a:fld id="{27D20013-6861-114D-B618-24C2282886EC}" type="datetimeFigureOut">
               <a:rPr lang="en-US" smtClean="0"/>
-              <a:t>12/1/20</a:t>
+              <a:t>3/4/2021</a:t>
             </a:fld>
             <a:endParaRPr lang="en-US"/>
           </a:p>
@@ -2330,7 +2555,7 @@
           <a:p>
             <a:fld id="{27D20013-6861-114D-B618-24C2282886EC}" type="datetimeFigureOut">
               <a:rPr lang="en-US" smtClean="0"/>
-              <a:t>12/1/20</a:t>
+              <a:t>3/4/2021</a:t>
             </a:fld>
             <a:endParaRPr lang="en-US"/>
           </a:p>
@@ -2641,7 +2866,7 @@
           <a:p>
             <a:fld id="{27D20013-6861-114D-B618-24C2282886EC}" type="datetimeFigureOut">
               <a:rPr lang="en-US" smtClean="0"/>
-              <a:t>12/1/20</a:t>
+              <a:t>3/4/2021</a:t>
             </a:fld>
             <a:endParaRPr lang="en-US"/>
           </a:p>
@@ -2929,7 +3154,7 @@
           <a:p>
             <a:fld id="{27D20013-6861-114D-B618-24C2282886EC}" type="datetimeFigureOut">
               <a:rPr lang="en-US" smtClean="0"/>
-              <a:t>12/1/20</a:t>
+              <a:t>3/4/2021</a:t>
             </a:fld>
             <a:endParaRPr lang="en-US"/>
           </a:p>
@@ -3170,7 +3395,7 @@
           <a:p>
             <a:fld id="{27D20013-6861-114D-B618-24C2282886EC}" type="datetimeFigureOut">
               <a:rPr lang="en-US" smtClean="0"/>
-              <a:t>12/1/20</a:t>
+              <a:t>3/4/2021</a:t>
             </a:fld>
             <a:endParaRPr lang="en-US"/>
           </a:p>
@@ -4242,6 +4467,1127 @@
 </p:sld>
 </file>
 
+<file path=ppt/slides/slide2.xml><?xml version="1.0" encoding="utf-8"?>
+<p:sld xmlns:a="http://schemas.openxmlformats.org/drawingml/2006/main" xmlns:r="http://schemas.openxmlformats.org/officeDocument/2006/relationships" xmlns:p="http://schemas.openxmlformats.org/presentationml/2006/main">
+  <p:cSld>
+    <p:spTree>
+      <p:nvGrpSpPr>
+        <p:cNvPr id="1" name=""/>
+        <p:cNvGrpSpPr/>
+        <p:nvPr/>
+      </p:nvGrpSpPr>
+      <p:grpSpPr>
+        <a:xfrm>
+          <a:off x="0" y="0"/>
+          <a:ext cx="0" cy="0"/>
+          <a:chOff x="0" y="0"/>
+          <a:chExt cx="0" cy="0"/>
+        </a:xfrm>
+      </p:grpSpPr>
+      <p:sp>
+        <p:nvSpPr>
+          <p:cNvPr id="4" name="TextBox 3">
+            <a:extLst>
+              <a:ext uri="{FF2B5EF4-FFF2-40B4-BE49-F238E27FC236}">
+                <a16:creationId xmlns:a16="http://schemas.microsoft.com/office/drawing/2014/main" id="{121308C4-2E3E-4F3D-A394-FADB8C0222E1}"/>
+              </a:ext>
+            </a:extLst>
+          </p:cNvPr>
+          <p:cNvSpPr txBox="1"/>
+          <p:nvPr/>
+        </p:nvSpPr>
+        <p:spPr>
+          <a:xfrm>
+            <a:off x="5698744" y="473709"/>
+            <a:ext cx="794512" cy="369332"/>
+          </a:xfrm>
+          <a:prstGeom prst="rect">
+            <a:avLst/>
+          </a:prstGeom>
+          <a:solidFill>
+            <a:schemeClr val="accent1"/>
+          </a:solidFill>
+        </p:spPr>
+        <p:txBody>
+          <a:bodyPr wrap="none" rtlCol="0">
+            <a:spAutoFit/>
+          </a:bodyPr>
+          <a:lstStyle/>
+          <a:p>
+            <a:pPr algn="ctr"/>
+            <a:r>
+              <a:rPr lang="en-US" dirty="0">
+                <a:solidFill>
+                  <a:schemeClr val="bg1"/>
+                </a:solidFill>
+              </a:rPr>
+              <a:t>Vector</a:t>
+            </a:r>
+          </a:p>
+        </p:txBody>
+      </p:sp>
+      <p:sp>
+        <p:nvSpPr>
+          <p:cNvPr id="5" name="TextBox 4">
+            <a:extLst>
+              <a:ext uri="{FF2B5EF4-FFF2-40B4-BE49-F238E27FC236}">
+                <a16:creationId xmlns:a16="http://schemas.microsoft.com/office/drawing/2014/main" id="{92C9CBEA-75BF-43B1-A8F6-A80EA453EEAD}"/>
+              </a:ext>
+            </a:extLst>
+          </p:cNvPr>
+          <p:cNvSpPr txBox="1"/>
+          <p:nvPr/>
+        </p:nvSpPr>
+        <p:spPr>
+          <a:xfrm>
+            <a:off x="5578615" y="2981850"/>
+            <a:ext cx="1034770" cy="369332"/>
+          </a:xfrm>
+          <a:prstGeom prst="rect">
+            <a:avLst/>
+          </a:prstGeom>
+          <a:solidFill>
+            <a:schemeClr val="accent1"/>
+          </a:solidFill>
+        </p:spPr>
+        <p:txBody>
+          <a:bodyPr wrap="none" rtlCol="0">
+            <a:spAutoFit/>
+          </a:bodyPr>
+          <a:lstStyle/>
+          <a:p>
+            <a:pPr algn="ctr"/>
+            <a:r>
+              <a:rPr lang="en-US" dirty="0">
+                <a:solidFill>
+                  <a:schemeClr val="bg1"/>
+                </a:solidFill>
+              </a:rPr>
+              <a:t>Operator</a:t>
+            </a:r>
+          </a:p>
+        </p:txBody>
+      </p:sp>
+      <p:sp>
+        <p:nvSpPr>
+          <p:cNvPr id="6" name="TextBox 5">
+            <a:extLst>
+              <a:ext uri="{FF2B5EF4-FFF2-40B4-BE49-F238E27FC236}">
+                <a16:creationId xmlns:a16="http://schemas.microsoft.com/office/drawing/2014/main" id="{F41A4D95-6294-424A-A44D-46A22CDE9056}"/>
+              </a:ext>
+            </a:extLst>
+          </p:cNvPr>
+          <p:cNvSpPr txBox="1"/>
+          <p:nvPr/>
+        </p:nvSpPr>
+        <p:spPr>
+          <a:xfrm>
+            <a:off x="2772133" y="3940162"/>
+            <a:ext cx="799706" cy="369332"/>
+          </a:xfrm>
+          <a:prstGeom prst="rect">
+            <a:avLst/>
+          </a:prstGeom>
+          <a:solidFill>
+            <a:schemeClr val="accent1"/>
+          </a:solidFill>
+        </p:spPr>
+        <p:txBody>
+          <a:bodyPr wrap="none" rtlCol="0">
+            <a:spAutoFit/>
+          </a:bodyPr>
+          <a:lstStyle/>
+          <a:p>
+            <a:pPr algn="ctr"/>
+            <a:r>
+              <a:rPr lang="en-US" dirty="0">
+                <a:solidFill>
+                  <a:schemeClr val="bg1"/>
+                </a:solidFill>
+              </a:rPr>
+              <a:t>Matrix</a:t>
+            </a:r>
+          </a:p>
+        </p:txBody>
+      </p:sp>
+      <p:sp>
+        <p:nvSpPr>
+          <p:cNvPr id="7" name="TextBox 6">
+            <a:extLst>
+              <a:ext uri="{FF2B5EF4-FFF2-40B4-BE49-F238E27FC236}">
+                <a16:creationId xmlns:a16="http://schemas.microsoft.com/office/drawing/2014/main" id="{1BF7E86D-EB74-4684-885A-078F2952FB3D}"/>
+              </a:ext>
+            </a:extLst>
+          </p:cNvPr>
+          <p:cNvSpPr txBox="1"/>
+          <p:nvPr/>
+        </p:nvSpPr>
+        <p:spPr>
+          <a:xfrm>
+            <a:off x="8716043" y="3940162"/>
+            <a:ext cx="1666996" cy="369332"/>
+          </a:xfrm>
+          <a:prstGeom prst="rect">
+            <a:avLst/>
+          </a:prstGeom>
+          <a:solidFill>
+            <a:schemeClr val="accent1"/>
+          </a:solidFill>
+        </p:spPr>
+        <p:txBody>
+          <a:bodyPr wrap="none" rtlCol="0">
+            <a:spAutoFit/>
+          </a:bodyPr>
+          <a:lstStyle/>
+          <a:p>
+            <a:pPr algn="ctr"/>
+            <a:r>
+              <a:rPr lang="en-US" dirty="0" err="1">
+                <a:solidFill>
+                  <a:schemeClr val="bg1"/>
+                </a:solidFill>
+              </a:rPr>
+              <a:t>HypreParMatrix</a:t>
+            </a:r>
+            <a:endParaRPr lang="en-US" dirty="0">
+              <a:solidFill>
+                <a:schemeClr val="bg1"/>
+              </a:solidFill>
+            </a:endParaRPr>
+          </a:p>
+        </p:txBody>
+      </p:sp>
+      <p:sp>
+        <p:nvSpPr>
+          <p:cNvPr id="8" name="TextBox 7">
+            <a:extLst>
+              <a:ext uri="{FF2B5EF4-FFF2-40B4-BE49-F238E27FC236}">
+                <a16:creationId xmlns:a16="http://schemas.microsoft.com/office/drawing/2014/main" id="{BCA3D6ED-FC09-45C2-BE4E-00CCCA859C2D}"/>
+              </a:ext>
+            </a:extLst>
+          </p:cNvPr>
+          <p:cNvSpPr txBox="1"/>
+          <p:nvPr/>
+        </p:nvSpPr>
+        <p:spPr>
+          <a:xfrm>
+            <a:off x="944968" y="4839064"/>
+            <a:ext cx="1385379" cy="369332"/>
+          </a:xfrm>
+          <a:prstGeom prst="rect">
+            <a:avLst/>
+          </a:prstGeom>
+          <a:solidFill>
+            <a:schemeClr val="accent1"/>
+          </a:solidFill>
+        </p:spPr>
+        <p:txBody>
+          <a:bodyPr wrap="none" rtlCol="0">
+            <a:spAutoFit/>
+          </a:bodyPr>
+          <a:lstStyle/>
+          <a:p>
+            <a:pPr algn="ctr"/>
+            <a:r>
+              <a:rPr lang="en-US" dirty="0" err="1">
+                <a:solidFill>
+                  <a:schemeClr val="bg1"/>
+                </a:solidFill>
+              </a:rPr>
+              <a:t>BilinearForm</a:t>
+            </a:r>
+            <a:endParaRPr lang="en-US" dirty="0">
+              <a:solidFill>
+                <a:schemeClr val="bg1"/>
+              </a:solidFill>
+            </a:endParaRPr>
+          </a:p>
+        </p:txBody>
+      </p:sp>
+      <p:sp>
+        <p:nvSpPr>
+          <p:cNvPr id="9" name="TextBox 8">
+            <a:extLst>
+              <a:ext uri="{FF2B5EF4-FFF2-40B4-BE49-F238E27FC236}">
+                <a16:creationId xmlns:a16="http://schemas.microsoft.com/office/drawing/2014/main" id="{DEA41EFD-5CD4-4DC6-B040-A19C944DEE88}"/>
+              </a:ext>
+            </a:extLst>
+          </p:cNvPr>
+          <p:cNvSpPr txBox="1"/>
+          <p:nvPr/>
+        </p:nvSpPr>
+        <p:spPr>
+          <a:xfrm>
+            <a:off x="792748" y="5859369"/>
+            <a:ext cx="1689822" cy="369332"/>
+          </a:xfrm>
+          <a:prstGeom prst="rect">
+            <a:avLst/>
+          </a:prstGeom>
+          <a:solidFill>
+            <a:schemeClr val="accent1"/>
+          </a:solidFill>
+        </p:spPr>
+        <p:txBody>
+          <a:bodyPr wrap="none" rtlCol="0">
+            <a:spAutoFit/>
+          </a:bodyPr>
+          <a:lstStyle/>
+          <a:p>
+            <a:pPr algn="ctr"/>
+            <a:r>
+              <a:rPr lang="en-US" dirty="0" err="1">
+                <a:solidFill>
+                  <a:schemeClr val="bg1"/>
+                </a:solidFill>
+              </a:rPr>
+              <a:t>ParBilinearForm</a:t>
+            </a:r>
+            <a:endParaRPr lang="en-US" dirty="0">
+              <a:solidFill>
+                <a:schemeClr val="bg1"/>
+              </a:solidFill>
+            </a:endParaRPr>
+          </a:p>
+        </p:txBody>
+      </p:sp>
+      <p:sp>
+        <p:nvSpPr>
+          <p:cNvPr id="10" name="TextBox 9">
+            <a:extLst>
+              <a:ext uri="{FF2B5EF4-FFF2-40B4-BE49-F238E27FC236}">
+                <a16:creationId xmlns:a16="http://schemas.microsoft.com/office/drawing/2014/main" id="{D52B9E34-8E8F-449A-AE1F-31E3DDC221C3}"/>
+              </a:ext>
+            </a:extLst>
+          </p:cNvPr>
+          <p:cNvSpPr txBox="1"/>
+          <p:nvPr/>
+        </p:nvSpPr>
+        <p:spPr>
+          <a:xfrm>
+            <a:off x="3372035" y="4839064"/>
+            <a:ext cx="1965987" cy="369332"/>
+          </a:xfrm>
+          <a:prstGeom prst="rect">
+            <a:avLst/>
+          </a:prstGeom>
+          <a:solidFill>
+            <a:schemeClr val="accent1"/>
+          </a:solidFill>
+        </p:spPr>
+        <p:txBody>
+          <a:bodyPr wrap="none" rtlCol="0">
+            <a:spAutoFit/>
+          </a:bodyPr>
+          <a:lstStyle/>
+          <a:p>
+            <a:pPr algn="ctr"/>
+            <a:r>
+              <a:rPr lang="en-US" dirty="0" err="1">
+                <a:solidFill>
+                  <a:schemeClr val="bg1"/>
+                </a:solidFill>
+              </a:rPr>
+              <a:t>MixedBilinearForm</a:t>
+            </a:r>
+            <a:endParaRPr lang="en-US" dirty="0">
+              <a:solidFill>
+                <a:schemeClr val="bg1"/>
+              </a:solidFill>
+            </a:endParaRPr>
+          </a:p>
+        </p:txBody>
+      </p:sp>
+      <p:sp>
+        <p:nvSpPr>
+          <p:cNvPr id="11" name="TextBox 10">
+            <a:extLst>
+              <a:ext uri="{FF2B5EF4-FFF2-40B4-BE49-F238E27FC236}">
+                <a16:creationId xmlns:a16="http://schemas.microsoft.com/office/drawing/2014/main" id="{AE1C2BC6-FBC6-4DBA-AD5D-4CF9074077F2}"/>
+              </a:ext>
+            </a:extLst>
+          </p:cNvPr>
+          <p:cNvSpPr txBox="1"/>
+          <p:nvPr/>
+        </p:nvSpPr>
+        <p:spPr>
+          <a:xfrm>
+            <a:off x="3219816" y="5859369"/>
+            <a:ext cx="2270430" cy="369332"/>
+          </a:xfrm>
+          <a:prstGeom prst="rect">
+            <a:avLst/>
+          </a:prstGeom>
+          <a:solidFill>
+            <a:schemeClr val="accent1"/>
+          </a:solidFill>
+        </p:spPr>
+        <p:txBody>
+          <a:bodyPr wrap="none" rtlCol="0">
+            <a:spAutoFit/>
+          </a:bodyPr>
+          <a:lstStyle/>
+          <a:p>
+            <a:pPr algn="ctr"/>
+            <a:r>
+              <a:rPr lang="en-US" dirty="0" err="1">
+                <a:solidFill>
+                  <a:schemeClr val="bg1"/>
+                </a:solidFill>
+              </a:rPr>
+              <a:t>ParMixedBilinearForm</a:t>
+            </a:r>
+            <a:endParaRPr lang="en-US" dirty="0">
+              <a:solidFill>
+                <a:schemeClr val="bg1"/>
+              </a:solidFill>
+            </a:endParaRPr>
+          </a:p>
+        </p:txBody>
+      </p:sp>
+      <p:sp>
+        <p:nvSpPr>
+          <p:cNvPr id="12" name="TextBox 11">
+            <a:extLst>
+              <a:ext uri="{FF2B5EF4-FFF2-40B4-BE49-F238E27FC236}">
+                <a16:creationId xmlns:a16="http://schemas.microsoft.com/office/drawing/2014/main" id="{817B6B7C-417F-4328-AA10-0B990C1A95EB}"/>
+              </a:ext>
+            </a:extLst>
+          </p:cNvPr>
+          <p:cNvSpPr txBox="1"/>
+          <p:nvPr/>
+        </p:nvSpPr>
+        <p:spPr>
+          <a:xfrm>
+            <a:off x="2683227" y="1189213"/>
+            <a:ext cx="1377621" cy="646331"/>
+          </a:xfrm>
+          <a:prstGeom prst="rect">
+            <a:avLst/>
+          </a:prstGeom>
+          <a:solidFill>
+            <a:schemeClr val="accent1"/>
+          </a:solidFill>
+        </p:spPr>
+        <p:txBody>
+          <a:bodyPr wrap="none" rtlCol="0">
+            <a:spAutoFit/>
+          </a:bodyPr>
+          <a:lstStyle/>
+          <a:p>
+            <a:pPr algn="ctr"/>
+            <a:r>
+              <a:rPr lang="en-US" dirty="0" err="1">
+                <a:solidFill>
+                  <a:schemeClr val="bg1"/>
+                </a:solidFill>
+              </a:rPr>
+              <a:t>LinearForm</a:t>
+            </a:r>
+            <a:endParaRPr lang="en-US" dirty="0">
+              <a:solidFill>
+                <a:schemeClr val="bg1"/>
+              </a:solidFill>
+            </a:endParaRPr>
+          </a:p>
+          <a:p>
+            <a:pPr algn="ctr"/>
+            <a:r>
+              <a:rPr lang="en-US" dirty="0">
+                <a:solidFill>
+                  <a:schemeClr val="bg1"/>
+                </a:solidFill>
+              </a:rPr>
+              <a:t>(dual vector)</a:t>
+            </a:r>
+          </a:p>
+        </p:txBody>
+      </p:sp>
+      <p:sp>
+        <p:nvSpPr>
+          <p:cNvPr id="13" name="TextBox 12">
+            <a:extLst>
+              <a:ext uri="{FF2B5EF4-FFF2-40B4-BE49-F238E27FC236}">
+                <a16:creationId xmlns:a16="http://schemas.microsoft.com/office/drawing/2014/main" id="{3BFF5A7E-88FA-42E0-83AB-1BDE2C93B3F0}"/>
+              </a:ext>
+            </a:extLst>
+          </p:cNvPr>
+          <p:cNvSpPr txBox="1"/>
+          <p:nvPr/>
+        </p:nvSpPr>
+        <p:spPr>
+          <a:xfrm>
+            <a:off x="2567200" y="2148816"/>
+            <a:ext cx="1609671" cy="369332"/>
+          </a:xfrm>
+          <a:prstGeom prst="rect">
+            <a:avLst/>
+          </a:prstGeom>
+          <a:solidFill>
+            <a:schemeClr val="accent1"/>
+          </a:solidFill>
+        </p:spPr>
+        <p:txBody>
+          <a:bodyPr wrap="none" rtlCol="0">
+            <a:spAutoFit/>
+          </a:bodyPr>
+          <a:lstStyle/>
+          <a:p>
+            <a:pPr algn="ctr"/>
+            <a:r>
+              <a:rPr lang="en-US" dirty="0" err="1">
+                <a:solidFill>
+                  <a:schemeClr val="bg1"/>
+                </a:solidFill>
+              </a:rPr>
+              <a:t>ParLinearForm</a:t>
+            </a:r>
+            <a:endParaRPr lang="en-US" dirty="0">
+              <a:solidFill>
+                <a:schemeClr val="bg1"/>
+              </a:solidFill>
+            </a:endParaRPr>
+          </a:p>
+        </p:txBody>
+      </p:sp>
+      <p:sp>
+        <p:nvSpPr>
+          <p:cNvPr id="14" name="TextBox 13">
+            <a:extLst>
+              <a:ext uri="{FF2B5EF4-FFF2-40B4-BE49-F238E27FC236}">
+                <a16:creationId xmlns:a16="http://schemas.microsoft.com/office/drawing/2014/main" id="{4DF18C08-43B1-4781-AF54-85ECB26D27F8}"/>
+              </a:ext>
+            </a:extLst>
+          </p:cNvPr>
+          <p:cNvSpPr txBox="1"/>
+          <p:nvPr/>
+        </p:nvSpPr>
+        <p:spPr>
+          <a:xfrm>
+            <a:off x="5309409" y="1189213"/>
+            <a:ext cx="1573188" cy="646331"/>
+          </a:xfrm>
+          <a:prstGeom prst="rect">
+            <a:avLst/>
+          </a:prstGeom>
+          <a:solidFill>
+            <a:schemeClr val="accent1"/>
+          </a:solidFill>
+        </p:spPr>
+        <p:txBody>
+          <a:bodyPr wrap="none" rtlCol="0">
+            <a:spAutoFit/>
+          </a:bodyPr>
+          <a:lstStyle/>
+          <a:p>
+            <a:pPr algn="ctr"/>
+            <a:r>
+              <a:rPr lang="en-US" dirty="0" err="1">
+                <a:solidFill>
+                  <a:schemeClr val="bg1"/>
+                </a:solidFill>
+              </a:rPr>
+              <a:t>GridFunction</a:t>
+            </a:r>
+            <a:endParaRPr lang="en-US" dirty="0">
+              <a:solidFill>
+                <a:schemeClr val="bg1"/>
+              </a:solidFill>
+            </a:endParaRPr>
+          </a:p>
+          <a:p>
+            <a:pPr algn="ctr"/>
+            <a:r>
+              <a:rPr lang="en-US" dirty="0">
+                <a:solidFill>
+                  <a:schemeClr val="bg1"/>
+                </a:solidFill>
+              </a:rPr>
+              <a:t>(primal vector)</a:t>
+            </a:r>
+          </a:p>
+        </p:txBody>
+      </p:sp>
+      <p:sp>
+        <p:nvSpPr>
+          <p:cNvPr id="15" name="TextBox 14">
+            <a:extLst>
+              <a:ext uri="{FF2B5EF4-FFF2-40B4-BE49-F238E27FC236}">
+                <a16:creationId xmlns:a16="http://schemas.microsoft.com/office/drawing/2014/main" id="{0B539B23-8772-44B8-9DE6-D6815E8B1E1C}"/>
+              </a:ext>
+            </a:extLst>
+          </p:cNvPr>
+          <p:cNvSpPr txBox="1"/>
+          <p:nvPr/>
+        </p:nvSpPr>
+        <p:spPr>
+          <a:xfrm>
+            <a:off x="5240704" y="2148816"/>
+            <a:ext cx="1710597" cy="369332"/>
+          </a:xfrm>
+          <a:prstGeom prst="rect">
+            <a:avLst/>
+          </a:prstGeom>
+          <a:solidFill>
+            <a:schemeClr val="accent1"/>
+          </a:solidFill>
+        </p:spPr>
+        <p:txBody>
+          <a:bodyPr wrap="none" rtlCol="0">
+            <a:spAutoFit/>
+          </a:bodyPr>
+          <a:lstStyle/>
+          <a:p>
+            <a:pPr algn="ctr"/>
+            <a:r>
+              <a:rPr lang="en-US" dirty="0" err="1">
+                <a:solidFill>
+                  <a:schemeClr val="bg1"/>
+                </a:solidFill>
+              </a:rPr>
+              <a:t>ParGridFunction</a:t>
+            </a:r>
+            <a:endParaRPr lang="en-US" dirty="0">
+              <a:solidFill>
+                <a:schemeClr val="bg1"/>
+              </a:solidFill>
+            </a:endParaRPr>
+          </a:p>
+        </p:txBody>
+      </p:sp>
+      <p:sp>
+        <p:nvSpPr>
+          <p:cNvPr id="16" name="TextBox 15">
+            <a:extLst>
+              <a:ext uri="{FF2B5EF4-FFF2-40B4-BE49-F238E27FC236}">
+                <a16:creationId xmlns:a16="http://schemas.microsoft.com/office/drawing/2014/main" id="{E311D4A4-6390-4140-A3DD-F4878D36DC07}"/>
+              </a:ext>
+            </a:extLst>
+          </p:cNvPr>
+          <p:cNvSpPr txBox="1"/>
+          <p:nvPr/>
+        </p:nvSpPr>
+        <p:spPr>
+          <a:xfrm>
+            <a:off x="8718641" y="1189213"/>
+            <a:ext cx="1661802" cy="369332"/>
+          </a:xfrm>
+          <a:prstGeom prst="rect">
+            <a:avLst/>
+          </a:prstGeom>
+          <a:solidFill>
+            <a:schemeClr val="accent1"/>
+          </a:solidFill>
+        </p:spPr>
+        <p:txBody>
+          <a:bodyPr wrap="none" rtlCol="0">
+            <a:spAutoFit/>
+          </a:bodyPr>
+          <a:lstStyle/>
+          <a:p>
+            <a:pPr algn="ctr"/>
+            <a:r>
+              <a:rPr lang="en-US" dirty="0" err="1">
+                <a:solidFill>
+                  <a:schemeClr val="bg1"/>
+                </a:solidFill>
+              </a:rPr>
+              <a:t>HypreParVector</a:t>
+            </a:r>
+            <a:endParaRPr lang="en-US" dirty="0">
+              <a:solidFill>
+                <a:schemeClr val="bg1"/>
+              </a:solidFill>
+            </a:endParaRPr>
+          </a:p>
+        </p:txBody>
+      </p:sp>
+      <p:cxnSp>
+        <p:nvCxnSpPr>
+          <p:cNvPr id="17" name="Straight Arrow Connector 16">
+            <a:extLst>
+              <a:ext uri="{FF2B5EF4-FFF2-40B4-BE49-F238E27FC236}">
+                <a16:creationId xmlns:a16="http://schemas.microsoft.com/office/drawing/2014/main" id="{045286BB-399E-43E6-8FCA-7B6D789E8CFA}"/>
+              </a:ext>
+            </a:extLst>
+          </p:cNvPr>
+          <p:cNvCxnSpPr>
+            <a:cxnSpLocks/>
+            <a:stCxn id="4" idx="2"/>
+            <a:endCxn id="12" idx="0"/>
+          </p:cNvCxnSpPr>
+          <p:nvPr/>
+        </p:nvCxnSpPr>
+        <p:spPr>
+          <a:xfrm flipH="1">
+            <a:off x="3372038" y="843041"/>
+            <a:ext cx="2723962" cy="346172"/>
+          </a:xfrm>
+          <a:prstGeom prst="straightConnector1">
+            <a:avLst/>
+          </a:prstGeom>
+          <a:ln>
+            <a:tailEnd type="triangle" w="lg" len="lg"/>
+          </a:ln>
+        </p:spPr>
+        <p:style>
+          <a:lnRef idx="1">
+            <a:schemeClr val="dk1"/>
+          </a:lnRef>
+          <a:fillRef idx="0">
+            <a:schemeClr val="dk1"/>
+          </a:fillRef>
+          <a:effectRef idx="0">
+            <a:schemeClr val="dk1"/>
+          </a:effectRef>
+          <a:fontRef idx="minor">
+            <a:schemeClr val="tx1"/>
+          </a:fontRef>
+        </p:style>
+      </p:cxnSp>
+      <p:cxnSp>
+        <p:nvCxnSpPr>
+          <p:cNvPr id="20" name="Straight Arrow Connector 19">
+            <a:extLst>
+              <a:ext uri="{FF2B5EF4-FFF2-40B4-BE49-F238E27FC236}">
+                <a16:creationId xmlns:a16="http://schemas.microsoft.com/office/drawing/2014/main" id="{023D619B-DE59-4C8F-8A98-22BE930782D9}"/>
+              </a:ext>
+            </a:extLst>
+          </p:cNvPr>
+          <p:cNvCxnSpPr>
+            <a:cxnSpLocks/>
+            <a:stCxn id="12" idx="2"/>
+            <a:endCxn id="13" idx="0"/>
+          </p:cNvCxnSpPr>
+          <p:nvPr/>
+        </p:nvCxnSpPr>
+        <p:spPr>
+          <a:xfrm flipH="1">
+            <a:off x="3372036" y="1835544"/>
+            <a:ext cx="2" cy="313272"/>
+          </a:xfrm>
+          <a:prstGeom prst="straightConnector1">
+            <a:avLst/>
+          </a:prstGeom>
+          <a:ln>
+            <a:tailEnd type="triangle" w="lg" len="lg"/>
+          </a:ln>
+        </p:spPr>
+        <p:style>
+          <a:lnRef idx="1">
+            <a:schemeClr val="dk1"/>
+          </a:lnRef>
+          <a:fillRef idx="0">
+            <a:schemeClr val="dk1"/>
+          </a:fillRef>
+          <a:effectRef idx="0">
+            <a:schemeClr val="dk1"/>
+          </a:effectRef>
+          <a:fontRef idx="minor">
+            <a:schemeClr val="tx1"/>
+          </a:fontRef>
+        </p:style>
+      </p:cxnSp>
+      <p:cxnSp>
+        <p:nvCxnSpPr>
+          <p:cNvPr id="23" name="Straight Arrow Connector 22">
+            <a:extLst>
+              <a:ext uri="{FF2B5EF4-FFF2-40B4-BE49-F238E27FC236}">
+                <a16:creationId xmlns:a16="http://schemas.microsoft.com/office/drawing/2014/main" id="{BAB5042E-A3A8-4684-A2C5-E2AC929EC77E}"/>
+              </a:ext>
+            </a:extLst>
+          </p:cNvPr>
+          <p:cNvCxnSpPr>
+            <a:cxnSpLocks/>
+            <a:stCxn id="4" idx="2"/>
+            <a:endCxn id="14" idx="0"/>
+          </p:cNvCxnSpPr>
+          <p:nvPr/>
+        </p:nvCxnSpPr>
+        <p:spPr>
+          <a:xfrm>
+            <a:off x="6096000" y="843041"/>
+            <a:ext cx="3" cy="346172"/>
+          </a:xfrm>
+          <a:prstGeom prst="straightConnector1">
+            <a:avLst/>
+          </a:prstGeom>
+          <a:ln>
+            <a:tailEnd type="triangle" w="lg" len="lg"/>
+          </a:ln>
+        </p:spPr>
+        <p:style>
+          <a:lnRef idx="1">
+            <a:schemeClr val="dk1"/>
+          </a:lnRef>
+          <a:fillRef idx="0">
+            <a:schemeClr val="dk1"/>
+          </a:fillRef>
+          <a:effectRef idx="0">
+            <a:schemeClr val="dk1"/>
+          </a:effectRef>
+          <a:fontRef idx="minor">
+            <a:schemeClr val="tx1"/>
+          </a:fontRef>
+        </p:style>
+      </p:cxnSp>
+      <p:cxnSp>
+        <p:nvCxnSpPr>
+          <p:cNvPr id="26" name="Straight Arrow Connector 25">
+            <a:extLst>
+              <a:ext uri="{FF2B5EF4-FFF2-40B4-BE49-F238E27FC236}">
+                <a16:creationId xmlns:a16="http://schemas.microsoft.com/office/drawing/2014/main" id="{BFBEA564-41B4-4BCD-A345-4D8057BFA960}"/>
+              </a:ext>
+            </a:extLst>
+          </p:cNvPr>
+          <p:cNvCxnSpPr>
+            <a:cxnSpLocks/>
+            <a:stCxn id="14" idx="2"/>
+            <a:endCxn id="15" idx="0"/>
+          </p:cNvCxnSpPr>
+          <p:nvPr/>
+        </p:nvCxnSpPr>
+        <p:spPr>
+          <a:xfrm>
+            <a:off x="6096003" y="1835544"/>
+            <a:ext cx="0" cy="313272"/>
+          </a:xfrm>
+          <a:prstGeom prst="straightConnector1">
+            <a:avLst/>
+          </a:prstGeom>
+          <a:ln>
+            <a:tailEnd type="triangle" w="lg" len="lg"/>
+          </a:ln>
+        </p:spPr>
+        <p:style>
+          <a:lnRef idx="1">
+            <a:schemeClr val="dk1"/>
+          </a:lnRef>
+          <a:fillRef idx="0">
+            <a:schemeClr val="dk1"/>
+          </a:fillRef>
+          <a:effectRef idx="0">
+            <a:schemeClr val="dk1"/>
+          </a:effectRef>
+          <a:fontRef idx="minor">
+            <a:schemeClr val="tx1"/>
+          </a:fontRef>
+        </p:style>
+      </p:cxnSp>
+      <p:cxnSp>
+        <p:nvCxnSpPr>
+          <p:cNvPr id="29" name="Straight Arrow Connector 28">
+            <a:extLst>
+              <a:ext uri="{FF2B5EF4-FFF2-40B4-BE49-F238E27FC236}">
+                <a16:creationId xmlns:a16="http://schemas.microsoft.com/office/drawing/2014/main" id="{CBA61C35-5B66-4388-8A96-F4CA4AE65AA6}"/>
+              </a:ext>
+            </a:extLst>
+          </p:cNvPr>
+          <p:cNvCxnSpPr>
+            <a:cxnSpLocks/>
+            <a:stCxn id="4" idx="2"/>
+            <a:endCxn id="16" idx="0"/>
+          </p:cNvCxnSpPr>
+          <p:nvPr/>
+        </p:nvCxnSpPr>
+        <p:spPr>
+          <a:xfrm>
+            <a:off x="6096000" y="843041"/>
+            <a:ext cx="3453542" cy="346172"/>
+          </a:xfrm>
+          <a:prstGeom prst="straightConnector1">
+            <a:avLst/>
+          </a:prstGeom>
+          <a:ln>
+            <a:tailEnd type="triangle" w="lg" len="lg"/>
+          </a:ln>
+        </p:spPr>
+        <p:style>
+          <a:lnRef idx="1">
+            <a:schemeClr val="dk1"/>
+          </a:lnRef>
+          <a:fillRef idx="0">
+            <a:schemeClr val="dk1"/>
+          </a:fillRef>
+          <a:effectRef idx="0">
+            <a:schemeClr val="dk1"/>
+          </a:effectRef>
+          <a:fontRef idx="minor">
+            <a:schemeClr val="tx1"/>
+          </a:fontRef>
+        </p:style>
+      </p:cxnSp>
+      <p:cxnSp>
+        <p:nvCxnSpPr>
+          <p:cNvPr id="32" name="Straight Arrow Connector 31">
+            <a:extLst>
+              <a:ext uri="{FF2B5EF4-FFF2-40B4-BE49-F238E27FC236}">
+                <a16:creationId xmlns:a16="http://schemas.microsoft.com/office/drawing/2014/main" id="{D31C8629-916E-42DE-B847-0ECCBFB071F5}"/>
+              </a:ext>
+            </a:extLst>
+          </p:cNvPr>
+          <p:cNvCxnSpPr>
+            <a:cxnSpLocks/>
+            <a:stCxn id="5" idx="2"/>
+            <a:endCxn id="6" idx="0"/>
+          </p:cNvCxnSpPr>
+          <p:nvPr/>
+        </p:nvCxnSpPr>
+        <p:spPr>
+          <a:xfrm flipH="1">
+            <a:off x="3171986" y="3351182"/>
+            <a:ext cx="2924014" cy="588980"/>
+          </a:xfrm>
+          <a:prstGeom prst="straightConnector1">
+            <a:avLst/>
+          </a:prstGeom>
+          <a:ln>
+            <a:tailEnd type="triangle" w="lg" len="lg"/>
+          </a:ln>
+        </p:spPr>
+        <p:style>
+          <a:lnRef idx="1">
+            <a:schemeClr val="dk1"/>
+          </a:lnRef>
+          <a:fillRef idx="0">
+            <a:schemeClr val="dk1"/>
+          </a:fillRef>
+          <a:effectRef idx="0">
+            <a:schemeClr val="dk1"/>
+          </a:effectRef>
+          <a:fontRef idx="minor">
+            <a:schemeClr val="tx1"/>
+          </a:fontRef>
+        </p:style>
+      </p:cxnSp>
+      <p:cxnSp>
+        <p:nvCxnSpPr>
+          <p:cNvPr id="35" name="Straight Arrow Connector 34">
+            <a:extLst>
+              <a:ext uri="{FF2B5EF4-FFF2-40B4-BE49-F238E27FC236}">
+                <a16:creationId xmlns:a16="http://schemas.microsoft.com/office/drawing/2014/main" id="{3755E7D5-F571-40A5-AAF7-F02E423C19AF}"/>
+              </a:ext>
+            </a:extLst>
+          </p:cNvPr>
+          <p:cNvCxnSpPr>
+            <a:cxnSpLocks/>
+            <a:stCxn id="6" idx="2"/>
+            <a:endCxn id="8" idx="0"/>
+          </p:cNvCxnSpPr>
+          <p:nvPr/>
+        </p:nvCxnSpPr>
+        <p:spPr>
+          <a:xfrm flipH="1">
+            <a:off x="1637658" y="4309494"/>
+            <a:ext cx="1534328" cy="529570"/>
+          </a:xfrm>
+          <a:prstGeom prst="straightConnector1">
+            <a:avLst/>
+          </a:prstGeom>
+          <a:ln>
+            <a:tailEnd type="triangle" w="lg" len="lg"/>
+          </a:ln>
+        </p:spPr>
+        <p:style>
+          <a:lnRef idx="1">
+            <a:schemeClr val="dk1"/>
+          </a:lnRef>
+          <a:fillRef idx="0">
+            <a:schemeClr val="dk1"/>
+          </a:fillRef>
+          <a:effectRef idx="0">
+            <a:schemeClr val="dk1"/>
+          </a:effectRef>
+          <a:fontRef idx="minor">
+            <a:schemeClr val="tx1"/>
+          </a:fontRef>
+        </p:style>
+      </p:cxnSp>
+      <p:cxnSp>
+        <p:nvCxnSpPr>
+          <p:cNvPr id="38" name="Straight Arrow Connector 37">
+            <a:extLst>
+              <a:ext uri="{FF2B5EF4-FFF2-40B4-BE49-F238E27FC236}">
+                <a16:creationId xmlns:a16="http://schemas.microsoft.com/office/drawing/2014/main" id="{96019C68-655B-464D-8B9B-93D6D67A0A48}"/>
+              </a:ext>
+            </a:extLst>
+          </p:cNvPr>
+          <p:cNvCxnSpPr>
+            <a:cxnSpLocks/>
+            <a:stCxn id="6" idx="2"/>
+            <a:endCxn id="10" idx="0"/>
+          </p:cNvCxnSpPr>
+          <p:nvPr/>
+        </p:nvCxnSpPr>
+        <p:spPr>
+          <a:xfrm>
+            <a:off x="3171986" y="4309494"/>
+            <a:ext cx="1183043" cy="529570"/>
+          </a:xfrm>
+          <a:prstGeom prst="straightConnector1">
+            <a:avLst/>
+          </a:prstGeom>
+          <a:ln>
+            <a:tailEnd type="triangle" w="lg" len="lg"/>
+          </a:ln>
+        </p:spPr>
+        <p:style>
+          <a:lnRef idx="1">
+            <a:schemeClr val="dk1"/>
+          </a:lnRef>
+          <a:fillRef idx="0">
+            <a:schemeClr val="dk1"/>
+          </a:fillRef>
+          <a:effectRef idx="0">
+            <a:schemeClr val="dk1"/>
+          </a:effectRef>
+          <a:fontRef idx="minor">
+            <a:schemeClr val="tx1"/>
+          </a:fontRef>
+        </p:style>
+      </p:cxnSp>
+      <p:cxnSp>
+        <p:nvCxnSpPr>
+          <p:cNvPr id="41" name="Straight Arrow Connector 40">
+            <a:extLst>
+              <a:ext uri="{FF2B5EF4-FFF2-40B4-BE49-F238E27FC236}">
+                <a16:creationId xmlns:a16="http://schemas.microsoft.com/office/drawing/2014/main" id="{0B369185-E6DE-4D0F-90ED-6B04DEFCE478}"/>
+              </a:ext>
+            </a:extLst>
+          </p:cNvPr>
+          <p:cNvCxnSpPr>
+            <a:cxnSpLocks/>
+            <a:stCxn id="8" idx="2"/>
+            <a:endCxn id="9" idx="0"/>
+          </p:cNvCxnSpPr>
+          <p:nvPr/>
+        </p:nvCxnSpPr>
+        <p:spPr>
+          <a:xfrm>
+            <a:off x="1637658" y="5208396"/>
+            <a:ext cx="1" cy="650973"/>
+          </a:xfrm>
+          <a:prstGeom prst="straightConnector1">
+            <a:avLst/>
+          </a:prstGeom>
+          <a:ln>
+            <a:tailEnd type="triangle" w="lg" len="lg"/>
+          </a:ln>
+        </p:spPr>
+        <p:style>
+          <a:lnRef idx="1">
+            <a:schemeClr val="dk1"/>
+          </a:lnRef>
+          <a:fillRef idx="0">
+            <a:schemeClr val="dk1"/>
+          </a:fillRef>
+          <a:effectRef idx="0">
+            <a:schemeClr val="dk1"/>
+          </a:effectRef>
+          <a:fontRef idx="minor">
+            <a:schemeClr val="tx1"/>
+          </a:fontRef>
+        </p:style>
+      </p:cxnSp>
+      <p:cxnSp>
+        <p:nvCxnSpPr>
+          <p:cNvPr id="44" name="Straight Arrow Connector 43">
+            <a:extLst>
+              <a:ext uri="{FF2B5EF4-FFF2-40B4-BE49-F238E27FC236}">
+                <a16:creationId xmlns:a16="http://schemas.microsoft.com/office/drawing/2014/main" id="{2D102666-8FFE-4ED0-B752-51B83492D5D1}"/>
+              </a:ext>
+            </a:extLst>
+          </p:cNvPr>
+          <p:cNvCxnSpPr>
+            <a:cxnSpLocks/>
+            <a:stCxn id="10" idx="2"/>
+            <a:endCxn id="11" idx="0"/>
+          </p:cNvCxnSpPr>
+          <p:nvPr/>
+        </p:nvCxnSpPr>
+        <p:spPr>
+          <a:xfrm>
+            <a:off x="4355029" y="5208396"/>
+            <a:ext cx="2" cy="650973"/>
+          </a:xfrm>
+          <a:prstGeom prst="straightConnector1">
+            <a:avLst/>
+          </a:prstGeom>
+          <a:ln>
+            <a:tailEnd type="triangle" w="lg" len="lg"/>
+          </a:ln>
+        </p:spPr>
+        <p:style>
+          <a:lnRef idx="1">
+            <a:schemeClr val="dk1"/>
+          </a:lnRef>
+          <a:fillRef idx="0">
+            <a:schemeClr val="dk1"/>
+          </a:fillRef>
+          <a:effectRef idx="0">
+            <a:schemeClr val="dk1"/>
+          </a:effectRef>
+          <a:fontRef idx="minor">
+            <a:schemeClr val="tx1"/>
+          </a:fontRef>
+        </p:style>
+      </p:cxnSp>
+      <p:cxnSp>
+        <p:nvCxnSpPr>
+          <p:cNvPr id="47" name="Straight Arrow Connector 46">
+            <a:extLst>
+              <a:ext uri="{FF2B5EF4-FFF2-40B4-BE49-F238E27FC236}">
+                <a16:creationId xmlns:a16="http://schemas.microsoft.com/office/drawing/2014/main" id="{F4D4A86B-C372-4ACB-95AA-627A7A5E38CD}"/>
+              </a:ext>
+            </a:extLst>
+          </p:cNvPr>
+          <p:cNvCxnSpPr>
+            <a:cxnSpLocks/>
+            <a:stCxn id="5" idx="2"/>
+            <a:endCxn id="7" idx="0"/>
+          </p:cNvCxnSpPr>
+          <p:nvPr/>
+        </p:nvCxnSpPr>
+        <p:spPr>
+          <a:xfrm>
+            <a:off x="6096000" y="3351182"/>
+            <a:ext cx="3453541" cy="588980"/>
+          </a:xfrm>
+          <a:prstGeom prst="straightConnector1">
+            <a:avLst/>
+          </a:prstGeom>
+          <a:ln>
+            <a:tailEnd type="triangle" w="lg" len="lg"/>
+          </a:ln>
+        </p:spPr>
+        <p:style>
+          <a:lnRef idx="1">
+            <a:schemeClr val="dk1"/>
+          </a:lnRef>
+          <a:fillRef idx="0">
+            <a:schemeClr val="dk1"/>
+          </a:fillRef>
+          <a:effectRef idx="0">
+            <a:schemeClr val="dk1"/>
+          </a:effectRef>
+          <a:fontRef idx="minor">
+            <a:schemeClr val="tx1"/>
+          </a:fontRef>
+        </p:style>
+      </p:cxnSp>
+    </p:spTree>
+    <p:extLst>
+      <p:ext uri="{BB962C8B-B14F-4D97-AF65-F5344CB8AC3E}">
+        <p14:creationId xmlns:p14="http://schemas.microsoft.com/office/powerpoint/2010/main" val="2986354180"/>
+      </p:ext>
+    </p:extLst>
+  </p:cSld>
+  <p:clrMapOvr>
+    <a:masterClrMapping/>
+  </p:clrMapOvr>
+</p:sld>
+</file>
+
 <file path=ppt/theme/theme1.xml><?xml version="1.0" encoding="utf-8"?>
 <a:theme xmlns:a="http://schemas.openxmlformats.org/drawingml/2006/main" name="Office Theme">
   <a:themeElements>

</xml_diff>